<commit_message>
add bullets to footer
</commit_message>
<xml_diff>
--- a/public/images/logo-RCM-coop-dev.pptx
+++ b/public/images/logo-RCM-coop-dev.pptx
@@ -9,8 +9,9 @@
     <p:sldId id="257" r:id="rId3"/>
     <p:sldId id="258" r:id="rId4"/>
     <p:sldId id="262" r:id="rId5"/>
-    <p:sldId id="267" r:id="rId6"/>
-    <p:sldId id="268" r:id="rId7"/>
+    <p:sldId id="269" r:id="rId6"/>
+    <p:sldId id="267" r:id="rId7"/>
+    <p:sldId id="268" r:id="rId8"/>
   </p:sldIdLst>
   <p:sldSz cx="12192000" cy="6858000"/>
   <p:notesSz cx="6858000" cy="9144000"/>
@@ -120,7 +121,7 @@
 <file path=ppt/revisionInfo.xml><?xml version="1.0" encoding="utf-8"?>
 <p1510:revInfo xmlns:a="http://schemas.openxmlformats.org/drawingml/2006/main" xmlns:r="http://schemas.openxmlformats.org/officeDocument/2006/relationships" xmlns:p1510="http://schemas.microsoft.com/office/powerpoint/2015/10/main">
   <p1510:revLst>
-    <p1510:client id="{F1C8B9D2-4377-2C45-B746-CF37BA7A4C1F}" v="13" dt="2025-01-30T17:57:32.477"/>
+    <p1510:client id="{F1C8B9D2-4377-2C45-B746-CF37BA7A4C1F}" v="15" dt="2025-01-30T22:02:56.202"/>
   </p1510:revLst>
 </p1510:revInfo>
 </file>
@@ -130,7 +131,7 @@
   <pc:docChgLst>
     <pc:chgData name="Cassandra Gould Van Praag" userId="d2248499-4cc7-4575-92a4-3dec06827e7f" providerId="ADAL" clId="{F1C8B9D2-4377-2C45-B746-CF37BA7A4C1F}"/>
     <pc:docChg chg="undo redo custSel addSld delSld modSld sldOrd">
-      <pc:chgData name="Cassandra Gould Van Praag" userId="d2248499-4cc7-4575-92a4-3dec06827e7f" providerId="ADAL" clId="{F1C8B9D2-4377-2C45-B746-CF37BA7A4C1F}" dt="2025-01-30T17:57:38.954" v="229" actId="478"/>
+      <pc:chgData name="Cassandra Gould Van Praag" userId="d2248499-4cc7-4575-92a4-3dec06827e7f" providerId="ADAL" clId="{F1C8B9D2-4377-2C45-B746-CF37BA7A4C1F}" dt="2025-01-30T22:02:56.202" v="237"/>
       <pc:docMkLst>
         <pc:docMk/>
       </pc:docMkLst>
@@ -466,6 +467,45 @@
           <pc:sldMk cId="608892475" sldId="268"/>
         </pc:sldMkLst>
       </pc:sldChg>
+      <pc:sldChg chg="addSp delSp modSp add mod">
+        <pc:chgData name="Cassandra Gould Van Praag" userId="d2248499-4cc7-4575-92a4-3dec06827e7f" providerId="ADAL" clId="{F1C8B9D2-4377-2C45-B746-CF37BA7A4C1F}" dt="2025-01-30T22:02:56.202" v="237"/>
+        <pc:sldMkLst>
+          <pc:docMk/>
+          <pc:sldMk cId="2701810344" sldId="269"/>
+        </pc:sldMkLst>
+        <pc:spChg chg="del">
+          <ac:chgData name="Cassandra Gould Van Praag" userId="d2248499-4cc7-4575-92a4-3dec06827e7f" providerId="ADAL" clId="{F1C8B9D2-4377-2C45-B746-CF37BA7A4C1F}" dt="2025-01-30T21:53:13.683" v="231" actId="478"/>
+          <ac:spMkLst>
+            <pc:docMk/>
+            <pc:sldMk cId="2701810344" sldId="269"/>
+            <ac:spMk id="2" creationId="{CA2ACC63-036E-A131-47D4-EFCA030AFB3D}"/>
+          </ac:spMkLst>
+        </pc:spChg>
+        <pc:spChg chg="del">
+          <ac:chgData name="Cassandra Gould Van Praag" userId="d2248499-4cc7-4575-92a4-3dec06827e7f" providerId="ADAL" clId="{F1C8B9D2-4377-2C45-B746-CF37BA7A4C1F}" dt="2025-01-30T21:53:22.076" v="234" actId="478"/>
+          <ac:spMkLst>
+            <pc:docMk/>
+            <pc:sldMk cId="2701810344" sldId="269"/>
+            <ac:spMk id="3" creationId="{4F2DE65E-95E7-8A45-3E16-DAD1F46FCAE4}"/>
+          </ac:spMkLst>
+        </pc:spChg>
+        <pc:picChg chg="add">
+          <ac:chgData name="Cassandra Gould Van Praag" userId="d2248499-4cc7-4575-92a4-3dec06827e7f" providerId="ADAL" clId="{F1C8B9D2-4377-2C45-B746-CF37BA7A4C1F}" dt="2025-01-30T22:02:56.202" v="237"/>
+          <ac:picMkLst>
+            <pc:docMk/>
+            <pc:sldMk cId="2701810344" sldId="269"/>
+            <ac:picMk id="4" creationId="{D9F51890-851B-182B-22AB-68656A8B163C}"/>
+          </ac:picMkLst>
+        </pc:picChg>
+        <pc:picChg chg="add del mod">
+          <ac:chgData name="Cassandra Gould Van Praag" userId="d2248499-4cc7-4575-92a4-3dec06827e7f" providerId="ADAL" clId="{F1C8B9D2-4377-2C45-B746-CF37BA7A4C1F}" dt="2025-01-30T22:02:55.269" v="236" actId="478"/>
+          <ac:picMkLst>
+            <pc:docMk/>
+            <pc:sldMk cId="2701810344" sldId="269"/>
+            <ac:picMk id="15" creationId="{F192A07C-9B3B-5B42-CF34-3ADC20E7A3FA}"/>
+          </ac:picMkLst>
+        </pc:picChg>
+      </pc:sldChg>
     </pc:docChg>
   </pc:docChgLst>
 </pc:chgInfo>
@@ -4617,6 +4657,80 @@
 <file path=ppt/slides/slide5.xml><?xml version="1.0" encoding="utf-8"?>
 <p:sld xmlns:a="http://schemas.openxmlformats.org/drawingml/2006/main" xmlns:r="http://schemas.openxmlformats.org/officeDocument/2006/relationships" xmlns:p="http://schemas.openxmlformats.org/presentationml/2006/main">
   <p:cSld>
+    <p:bg>
+      <p:bgPr>
+        <a:solidFill>
+          <a:schemeClr val="bg1"/>
+        </a:solidFill>
+        <a:effectLst/>
+      </p:bgPr>
+    </p:bg>
+    <p:spTree>
+      <p:nvGrpSpPr>
+        <p:cNvPr id="1" name="">
+          <a:extLst>
+            <a:ext uri="{FF2B5EF4-FFF2-40B4-BE49-F238E27FC236}">
+              <a16:creationId xmlns:a16="http://schemas.microsoft.com/office/drawing/2014/main" id="{4CDB063F-2BE2-7862-80D2-DD9D62B894B5}"/>
+            </a:ext>
+          </a:extLst>
+        </p:cNvPr>
+        <p:cNvGrpSpPr/>
+        <p:nvPr/>
+      </p:nvGrpSpPr>
+      <p:grpSpPr>
+        <a:xfrm>
+          <a:off x="0" y="0"/>
+          <a:ext cx="0" cy="0"/>
+          <a:chOff x="0" y="0"/>
+          <a:chExt cx="0" cy="0"/>
+        </a:xfrm>
+      </p:grpSpPr>
+      <p:pic>
+        <p:nvPicPr>
+          <p:cNvPr id="4" name="Picture 3">
+            <a:extLst>
+              <a:ext uri="{FF2B5EF4-FFF2-40B4-BE49-F238E27FC236}">
+                <a16:creationId xmlns:a16="http://schemas.microsoft.com/office/drawing/2014/main" id="{D9F51890-851B-182B-22AB-68656A8B163C}"/>
+              </a:ext>
+            </a:extLst>
+          </p:cNvPr>
+          <p:cNvPicPr>
+            <a:picLocks noChangeAspect="1"/>
+          </p:cNvPicPr>
+          <p:nvPr/>
+        </p:nvPicPr>
+        <p:blipFill>
+          <a:blip r:embed="rId2"/>
+          <a:stretch>
+            <a:fillRect/>
+          </a:stretch>
+        </p:blipFill>
+        <p:spPr>
+          <a:xfrm>
+            <a:off x="4191000" y="1358900"/>
+            <a:ext cx="3810000" cy="4140200"/>
+          </a:xfrm>
+          <a:prstGeom prst="rect">
+            <a:avLst/>
+          </a:prstGeom>
+        </p:spPr>
+      </p:pic>
+    </p:spTree>
+    <p:extLst>
+      <p:ext uri="{BB962C8B-B14F-4D97-AF65-F5344CB8AC3E}">
+        <p14:creationId xmlns:p14="http://schemas.microsoft.com/office/powerpoint/2010/main" val="2701810344"/>
+      </p:ext>
+    </p:extLst>
+  </p:cSld>
+  <p:clrMapOvr>
+    <a:masterClrMapping/>
+  </p:clrMapOvr>
+</p:sld>
+</file>
+
+<file path=ppt/slides/slide6.xml><?xml version="1.0" encoding="utf-8"?>
+<p:sld xmlns:a="http://schemas.openxmlformats.org/drawingml/2006/main" xmlns:r="http://schemas.openxmlformats.org/officeDocument/2006/relationships" xmlns:p="http://schemas.openxmlformats.org/presentationml/2006/main">
+  <p:cSld>
     <p:spTree>
       <p:nvGrpSpPr>
         <p:cNvPr id="1" name="">
@@ -4762,7 +4876,7 @@
 </p:sld>
 </file>
 
-<file path=ppt/slides/slide6.xml><?xml version="1.0" encoding="utf-8"?>
+<file path=ppt/slides/slide7.xml><?xml version="1.0" encoding="utf-8"?>
 <p:sld xmlns:a="http://schemas.openxmlformats.org/drawingml/2006/main" xmlns:r="http://schemas.openxmlformats.org/officeDocument/2006/relationships" xmlns:p="http://schemas.openxmlformats.org/presentationml/2006/main">
   <p:cSld>
     <p:spTree>

</xml_diff>